<commit_message>
Updated Lecture 3 + Examples
</commit_message>
<xml_diff>
--- a/03-Data-Types.pptx
+++ b/03-Data-Types.pptx
@@ -233,7 +233,7 @@
           <a:p>
             <a:fld id="{D9410851-135B-40D7-97B1-D76BA4B05515}" type="datetimeFigureOut">
               <a:rPr lang="en-US" smtClean="0"/>
-              <a:t>10/21/2015</a:t>
+              <a:t>10/29/2015</a:t>
             </a:fld>
             <a:endParaRPr lang="en-US"/>
           </a:p>
@@ -3252,17 +3252,7 @@
                   </a:schemeClr>
                 </a:solidFill>
               </a:rPr>
-              <a:t>се </a:t>
-            </a:r>
-            <a:r>
-              <a:rPr lang="bg-BG" sz="2800" dirty="0" smtClean="0">
-                <a:solidFill>
-                  <a:schemeClr val="bg1">
-                    <a:lumMod val="95000"/>
-                  </a:schemeClr>
-                </a:solidFill>
-              </a:rPr>
-              <a:t>извършва с операторите за сравнение:</a:t>
+              <a:t>се извършва с операторите за сравнение:</a:t>
             </a:r>
           </a:p>
           <a:p>
@@ -3401,17 +3391,7 @@
                   </a:schemeClr>
                 </a:solidFill>
               </a:rPr>
-              <a:t> (true/false</a:t>
-            </a:r>
-            <a:r>
-              <a:rPr lang="en-US" sz="2800" dirty="0" smtClean="0">
-                <a:solidFill>
-                  <a:schemeClr val="bg1">
-                    <a:lumMod val="95000"/>
-                  </a:schemeClr>
-                </a:solidFill>
-              </a:rPr>
-              <a:t>)</a:t>
+              <a:t> (true/false)</a:t>
             </a:r>
             <a:endParaRPr lang="en-US" sz="2800" dirty="0">
               <a:solidFill>
@@ -4338,6 +4318,26 @@
               <a:buChar char="§"/>
             </a:pPr>
             <a:r>
+              <a:rPr lang="ru-RU" sz="2000" dirty="0">
+                <a:solidFill>
+                  <a:schemeClr val="bg1">
+                    <a:lumMod val="95000"/>
+                  </a:schemeClr>
+                </a:solidFill>
+              </a:rPr>
+              <a:t>Напишете </a:t>
+            </a:r>
+            <a:r>
+              <a:rPr lang="ru-RU" sz="2000" dirty="0" err="1" smtClean="0">
+                <a:solidFill>
+                  <a:schemeClr val="bg1">
+                    <a:lumMod val="95000"/>
+                  </a:schemeClr>
+                </a:solidFill>
+              </a:rPr>
+              <a:t>програма</a:t>
+            </a:r>
+            <a:r>
               <a:rPr lang="ru-RU" sz="2000" dirty="0" smtClean="0">
                 <a:solidFill>
                   <a:schemeClr val="bg1">
@@ -4345,7 +4345,7 @@
                   </a:schemeClr>
                 </a:solidFill>
               </a:rPr>
-              <a:t>Напишете </a:t>
+              <a:t>, </a:t>
             </a:r>
             <a:r>
               <a:rPr lang="ru-RU" sz="2000" dirty="0">
@@ -4355,7 +4355,7 @@
                   </a:schemeClr>
                 </a:solidFill>
               </a:rPr>
-              <a:t>булев израз, който да проверява дали </a:t>
+              <a:t>която приема две </a:t>
             </a:r>
             <a:r>
               <a:rPr lang="ru-RU" sz="2000" dirty="0" smtClean="0">
@@ -4365,17 +4365,17 @@
                   </a:schemeClr>
                 </a:solidFill>
               </a:rPr>
-              <a:t>даден низ от </a:t>
-            </a:r>
-            <a:r>
-              <a:rPr lang="ru-RU" sz="2000" dirty="0" err="1" smtClean="0">
-                <a:solidFill>
-                  <a:schemeClr val="bg1">
-                    <a:lumMod val="95000"/>
-                  </a:schemeClr>
-                </a:solidFill>
-              </a:rPr>
-              <a:t>символи</a:t>
+              <a:t>цели числа - съответно страната и височината на триъгълник. </a:t>
+            </a:r>
+            <a:r>
+              <a:rPr lang="ru-RU" sz="2000" dirty="0">
+                <a:solidFill>
+                  <a:schemeClr val="bg1">
+                    <a:lumMod val="95000"/>
+                  </a:schemeClr>
+                </a:solidFill>
+              </a:rPr>
+              <a:t>Пресметнете лицето на дадения </a:t>
             </a:r>
             <a:r>
               <a:rPr lang="ru-RU" sz="2000" dirty="0" smtClean="0">
@@ -4385,7 +4385,17 @@
                   </a:schemeClr>
                 </a:solidFill>
               </a:rPr>
-              <a:t> </a:t>
+              <a:t>триъгълник и </a:t>
+            </a:r>
+            <a:r>
+              <a:rPr lang="ru-RU" sz="2000" dirty="0">
+                <a:solidFill>
+                  <a:schemeClr val="bg1">
+                    <a:lumMod val="95000"/>
+                  </a:schemeClr>
+                </a:solidFill>
+              </a:rPr>
+              <a:t>я изведете на </a:t>
             </a:r>
             <a:r>
               <a:rPr lang="ru-RU" sz="2000" dirty="0" smtClean="0">
@@ -4395,57 +4405,7 @@
                   </a:schemeClr>
                 </a:solidFill>
               </a:rPr>
-              <a:t>(</a:t>
-            </a:r>
-            <a:r>
-              <a:rPr lang="en-US" sz="2000" dirty="0" smtClean="0">
-                <a:solidFill>
-                  <a:schemeClr val="bg1">
-                    <a:lumMod val="95000"/>
-                  </a:schemeClr>
-                </a:solidFill>
-              </a:rPr>
-              <a:t>String</a:t>
-            </a:r>
-            <a:r>
-              <a:rPr lang="en-US" sz="2000" dirty="0" smtClean="0">
-                <a:solidFill>
-                  <a:schemeClr val="bg1">
-                    <a:lumMod val="95000"/>
-                  </a:schemeClr>
-                </a:solidFill>
-              </a:rPr>
-              <a:t>) </a:t>
-            </a:r>
-            <a:r>
-              <a:rPr lang="bg-BG" sz="2000" dirty="0" smtClean="0">
-                <a:solidFill>
-                  <a:schemeClr val="bg1">
-                    <a:lumMod val="95000"/>
-                  </a:schemeClr>
-                </a:solidFill>
-              </a:rPr>
-              <a:t>е равен на „</a:t>
-            </a:r>
-            <a:r>
-              <a:rPr lang="en-US" sz="2000" dirty="0" smtClean="0">
-                <a:solidFill>
-                  <a:schemeClr val="bg1">
-                    <a:lumMod val="95000"/>
-                  </a:schemeClr>
-                </a:solidFill>
-              </a:rPr>
-              <a:t>Hello”. </a:t>
-            </a:r>
-            <a:r>
-              <a:rPr lang="bg-BG" sz="2000" dirty="0" smtClean="0">
-                <a:solidFill>
-                  <a:schemeClr val="bg1">
-                    <a:lumMod val="95000"/>
-                  </a:schemeClr>
-                </a:solidFill>
-              </a:rPr>
-              <a:t>Отпечатайте в конзолата резултата от проверката.</a:t>
+              <a:t>конзолата.</a:t>
             </a:r>
           </a:p>
           <a:p>
@@ -4454,16 +4414,6 @@
               <a:buChar char="§"/>
             </a:pPr>
             <a:r>
-              <a:rPr lang="ru-RU" sz="2000" dirty="0">
-                <a:solidFill>
-                  <a:schemeClr val="bg1">
-                    <a:lumMod val="95000"/>
-                  </a:schemeClr>
-                </a:solidFill>
-              </a:rPr>
-              <a:t>Направете програма, която приема две </a:t>
-            </a:r>
-            <a:r>
               <a:rPr lang="ru-RU" sz="2000" dirty="0" smtClean="0">
                 <a:solidFill>
                   <a:schemeClr val="bg1">
@@ -4471,47 +4421,7 @@
                   </a:schemeClr>
                 </a:solidFill>
               </a:rPr>
-              <a:t>цели числа - съответно страната и височината на триъгълник. </a:t>
-            </a:r>
-            <a:r>
-              <a:rPr lang="ru-RU" sz="2000" dirty="0">
-                <a:solidFill>
-                  <a:schemeClr val="bg1">
-                    <a:lumMod val="95000"/>
-                  </a:schemeClr>
-                </a:solidFill>
-              </a:rPr>
-              <a:t>Пресметнете лицето на дадения </a:t>
-            </a:r>
-            <a:r>
-              <a:rPr lang="ru-RU" sz="2000" dirty="0" smtClean="0">
-                <a:solidFill>
-                  <a:schemeClr val="bg1">
-                    <a:lumMod val="95000"/>
-                  </a:schemeClr>
-                </a:solidFill>
-              </a:rPr>
-              <a:t>триъгълник и </a:t>
-            </a:r>
-            <a:r>
-              <a:rPr lang="ru-RU" sz="2000" dirty="0">
-                <a:solidFill>
-                  <a:schemeClr val="bg1">
-                    <a:lumMod val="95000"/>
-                  </a:schemeClr>
-                </a:solidFill>
-              </a:rPr>
-              <a:t>я изведете на </a:t>
-            </a:r>
-            <a:r>
-              <a:rPr lang="ru-RU" sz="2000" dirty="0" smtClean="0">
-                <a:solidFill>
-                  <a:schemeClr val="bg1">
-                    <a:lumMod val="95000"/>
-                  </a:schemeClr>
-                </a:solidFill>
-              </a:rPr>
-              <a:t>конзолата.</a:t>
+              <a:t>Напишете проргама която приема 2 целочислени числа за вход и извежда остатъка от делението на числата.</a:t>
             </a:r>
           </a:p>
           <a:p>
@@ -4527,8 +4437,65 @@
                   </a:schemeClr>
                 </a:solidFill>
               </a:rPr>
-              <a:t>Напишете проргама която приема 2 целочислени числа за вход и извежда остатъка от делението на числата.</a:t>
-            </a:r>
+              <a:t>Напишете програма, която приема 2 символни низа (</a:t>
+            </a:r>
+            <a:r>
+              <a:rPr lang="en-US" sz="2000" dirty="0" smtClean="0">
+                <a:solidFill>
+                  <a:schemeClr val="bg1">
+                    <a:lumMod val="95000"/>
+                  </a:schemeClr>
+                </a:solidFill>
+              </a:rPr>
+              <a:t>string) </a:t>
+            </a:r>
+            <a:r>
+              <a:rPr lang="bg-BG" sz="2000" dirty="0" smtClean="0">
+                <a:solidFill>
+                  <a:schemeClr val="bg1">
+                    <a:lumMod val="95000"/>
+                  </a:schemeClr>
+                </a:solidFill>
+              </a:rPr>
+              <a:t>като вход, и изведете като резултат конкатениран </a:t>
+            </a:r>
+            <a:r>
+              <a:rPr lang="en-US" sz="2000" dirty="0" smtClean="0">
+                <a:solidFill>
+                  <a:schemeClr val="bg1">
+                    <a:lumMod val="95000"/>
+                  </a:schemeClr>
+                </a:solidFill>
+              </a:rPr>
+              <a:t>string </a:t>
+            </a:r>
+            <a:r>
+              <a:rPr lang="bg-BG" sz="2000" dirty="0" smtClean="0">
+                <a:solidFill>
+                  <a:schemeClr val="bg1">
+                    <a:lumMod val="95000"/>
+                  </a:schemeClr>
+                </a:solidFill>
+              </a:rPr>
+              <a:t>със „_“ между двата входни низа</a:t>
+            </a:r>
+            <a:r>
+              <a:rPr lang="bg-BG" sz="2000" dirty="0" smtClean="0">
+                <a:solidFill>
+                  <a:schemeClr val="bg1">
+                    <a:lumMod val="95000"/>
+                  </a:schemeClr>
+                </a:solidFill>
+              </a:rPr>
+              <a:t>.</a:t>
+            </a:r>
+            <a:endParaRPr lang="en-US" sz="2000" dirty="0" smtClean="0">
+              <a:solidFill>
+                <a:schemeClr val="bg1">
+                  <a:lumMod val="95000"/>
+                </a:schemeClr>
+              </a:solidFill>
+            </a:endParaRPr>
           </a:p>
           <a:p>
             <a:pPr>
@@ -4536,55 +4503,221 @@
               <a:buChar char="§"/>
             </a:pPr>
             <a:r>
-              <a:rPr lang="ru-RU" sz="2000" dirty="0" smtClean="0">
-                <a:solidFill>
-                  <a:schemeClr val="bg1">
-                    <a:lumMod val="95000"/>
-                  </a:schemeClr>
-                </a:solidFill>
-              </a:rPr>
-              <a:t>Напишете програма, която приема 2 символни низа (</a:t>
-            </a:r>
-            <a:r>
-              <a:rPr lang="en-US" sz="2000" dirty="0" smtClean="0">
-                <a:solidFill>
-                  <a:schemeClr val="bg1">
-                    <a:lumMod val="95000"/>
-                  </a:schemeClr>
-                </a:solidFill>
-              </a:rPr>
-              <a:t>string) </a:t>
-            </a:r>
-            <a:r>
-              <a:rPr lang="bg-BG" sz="2000" dirty="0" smtClean="0">
-                <a:solidFill>
-                  <a:schemeClr val="bg1">
-                    <a:lumMod val="95000"/>
-                  </a:schemeClr>
-                </a:solidFill>
-              </a:rPr>
-              <a:t>като вход, и изведете като резултат конкатениран </a:t>
-            </a:r>
-            <a:r>
-              <a:rPr lang="en-US" sz="2000" dirty="0" smtClean="0">
-                <a:solidFill>
-                  <a:schemeClr val="bg1">
-                    <a:lumMod val="95000"/>
-                  </a:schemeClr>
-                </a:solidFill>
-              </a:rPr>
-              <a:t>string </a:t>
-            </a:r>
-            <a:r>
-              <a:rPr lang="bg-BG" sz="2000" dirty="0" smtClean="0">
-                <a:solidFill>
-                  <a:schemeClr val="bg1">
-                    <a:lumMod val="95000"/>
-                  </a:schemeClr>
-                </a:solidFill>
-              </a:rPr>
-              <a:t>със „_“ между двата входни низа.</a:t>
-            </a:r>
+              <a:rPr lang="ru-RU" sz="2000" dirty="0">
+                <a:solidFill>
+                  <a:schemeClr val="bg1">
+                    <a:lumMod val="95000"/>
+                  </a:schemeClr>
+                </a:solidFill>
+              </a:rPr>
+              <a:t>Напишете </a:t>
+            </a:r>
+            <a:r>
+              <a:rPr lang="ru-RU" sz="2000" dirty="0" err="1">
+                <a:solidFill>
+                  <a:schemeClr val="bg1">
+                    <a:lumMod val="95000"/>
+                  </a:schemeClr>
+                </a:solidFill>
+              </a:rPr>
+              <a:t>програма</a:t>
+            </a:r>
+            <a:r>
+              <a:rPr lang="ru-RU" sz="2000" dirty="0">
+                <a:solidFill>
+                  <a:schemeClr val="bg1">
+                    <a:lumMod val="95000"/>
+                  </a:schemeClr>
+                </a:solidFill>
+              </a:rPr>
+              <a:t>, </a:t>
+            </a:r>
+            <a:r>
+              <a:rPr lang="ru-RU" sz="2000" dirty="0" err="1">
+                <a:solidFill>
+                  <a:schemeClr val="bg1">
+                    <a:lumMod val="95000"/>
+                  </a:schemeClr>
+                </a:solidFill>
+              </a:rPr>
+              <a:t>която</a:t>
+            </a:r>
+            <a:r>
+              <a:rPr lang="ru-RU" sz="2000" dirty="0">
+                <a:solidFill>
+                  <a:schemeClr val="bg1">
+                    <a:lumMod val="95000"/>
+                  </a:schemeClr>
+                </a:solidFill>
+              </a:rPr>
+              <a:t> приема </a:t>
+            </a:r>
+            <a:r>
+              <a:rPr lang="ru-RU" sz="2000" dirty="0" err="1">
+                <a:solidFill>
+                  <a:schemeClr val="bg1">
+                    <a:lumMod val="95000"/>
+                  </a:schemeClr>
+                </a:solidFill>
+              </a:rPr>
+              <a:t>реално</a:t>
+            </a:r>
+            <a:r>
+              <a:rPr lang="ru-RU" sz="2000" dirty="0">
+                <a:solidFill>
+                  <a:schemeClr val="bg1">
+                    <a:lumMod val="95000"/>
+                  </a:schemeClr>
+                </a:solidFill>
+              </a:rPr>
+              <a:t> число </a:t>
+            </a:r>
+            <a:r>
+              <a:rPr lang="ru-RU" sz="2000" dirty="0" err="1">
+                <a:solidFill>
+                  <a:schemeClr val="bg1">
+                    <a:lumMod val="95000"/>
+                  </a:schemeClr>
+                </a:solidFill>
+              </a:rPr>
+              <a:t>като</a:t>
+            </a:r>
+            <a:r>
+              <a:rPr lang="ru-RU" sz="2000" dirty="0">
+                <a:solidFill>
+                  <a:schemeClr val="bg1">
+                    <a:lumMod val="95000"/>
+                  </a:schemeClr>
+                </a:solidFill>
+              </a:rPr>
+              <a:t> вход, и </a:t>
+            </a:r>
+            <a:r>
+              <a:rPr lang="ru-RU" sz="2000" dirty="0" err="1">
+                <a:solidFill>
+                  <a:schemeClr val="bg1">
+                    <a:lumMod val="95000"/>
+                  </a:schemeClr>
+                </a:solidFill>
+              </a:rPr>
+              <a:t>изкарва</a:t>
+            </a:r>
+            <a:r>
+              <a:rPr lang="ru-RU" sz="2000" dirty="0">
+                <a:solidFill>
+                  <a:schemeClr val="bg1">
+                    <a:lumMod val="95000"/>
+                  </a:schemeClr>
+                </a:solidFill>
+              </a:rPr>
+              <a:t> на </a:t>
+            </a:r>
+            <a:r>
+              <a:rPr lang="ru-RU" sz="2000" dirty="0" err="1">
+                <a:solidFill>
+                  <a:schemeClr val="bg1">
+                    <a:lumMod val="95000"/>
+                  </a:schemeClr>
+                </a:solidFill>
+              </a:rPr>
+              <a:t>конзолата</a:t>
+            </a:r>
+            <a:r>
+              <a:rPr lang="ru-RU" sz="2000" dirty="0">
+                <a:solidFill>
+                  <a:schemeClr val="bg1">
+                    <a:lumMod val="95000"/>
+                  </a:schemeClr>
+                </a:solidFill>
+              </a:rPr>
+              <a:t> </a:t>
+            </a:r>
+            <a:r>
+              <a:rPr lang="ru-RU" sz="2000" dirty="0" err="1">
+                <a:solidFill>
+                  <a:schemeClr val="bg1">
+                    <a:lumMod val="95000"/>
+                  </a:schemeClr>
+                </a:solidFill>
+              </a:rPr>
+              <a:t>резултата</a:t>
+            </a:r>
+            <a:r>
+              <a:rPr lang="ru-RU" sz="2000" dirty="0">
+                <a:solidFill>
+                  <a:schemeClr val="bg1">
+                    <a:lumMod val="95000"/>
+                  </a:schemeClr>
+                </a:solidFill>
+              </a:rPr>
+              <a:t> от </a:t>
+            </a:r>
+            <a:r>
+              <a:rPr lang="ru-RU" sz="2000" dirty="0" err="1">
+                <a:solidFill>
+                  <a:schemeClr val="bg1">
+                    <a:lumMod val="95000"/>
+                  </a:schemeClr>
+                </a:solidFill>
+              </a:rPr>
+              <a:t>делението</a:t>
+            </a:r>
+            <a:r>
+              <a:rPr lang="ru-RU" sz="2000" dirty="0">
+                <a:solidFill>
+                  <a:schemeClr val="bg1">
+                    <a:lumMod val="95000"/>
+                  </a:schemeClr>
+                </a:solidFill>
+              </a:rPr>
+              <a:t> </a:t>
+            </a:r>
+            <a:r>
+              <a:rPr lang="ru-RU" sz="2000" dirty="0" err="1">
+                <a:solidFill>
+                  <a:schemeClr val="bg1">
+                    <a:lumMod val="95000"/>
+                  </a:schemeClr>
+                </a:solidFill>
+              </a:rPr>
+              <a:t>му</a:t>
+            </a:r>
+            <a:r>
+              <a:rPr lang="ru-RU" sz="2000" dirty="0">
+                <a:solidFill>
+                  <a:schemeClr val="bg1">
+                    <a:lumMod val="95000"/>
+                  </a:schemeClr>
+                </a:solidFill>
+              </a:rPr>
+              <a:t> с </a:t>
+            </a:r>
+            <a:r>
+              <a:rPr lang="ru-RU" sz="2000" dirty="0" err="1">
+                <a:solidFill>
+                  <a:schemeClr val="bg1">
+                    <a:lumMod val="95000"/>
+                  </a:schemeClr>
+                </a:solidFill>
+              </a:rPr>
+              <a:t>цяло</a:t>
+            </a:r>
+            <a:r>
+              <a:rPr lang="ru-RU" sz="2000" dirty="0">
+                <a:solidFill>
+                  <a:schemeClr val="bg1">
+                    <a:lumMod val="95000"/>
+                  </a:schemeClr>
+                </a:solidFill>
+              </a:rPr>
+              <a:t> число.</a:t>
+            </a:r>
+          </a:p>
+          <a:p>
+            <a:pPr>
+              <a:buFont typeface="Wingdings" panose="05000000000000000000" pitchFamily="2" charset="2"/>
+              <a:buChar char="§"/>
+            </a:pPr>
             <a:endParaRPr lang="en-US" sz="2000" dirty="0">
               <a:solidFill>
                 <a:schemeClr val="bg1">
@@ -4709,22 +4842,6 @@
               <a:buChar char="§"/>
             </a:pPr>
             <a:r>
-              <a:rPr lang="ru-RU" sz="2000" dirty="0" smtClean="0">
-                <a:solidFill>
-                  <a:schemeClr val="bg1">
-                    <a:lumMod val="95000"/>
-                  </a:schemeClr>
-                </a:solidFill>
-              </a:rPr>
-              <a:t>Напишете програма, която приема реално число като вход, и изкарва на конзолата резултата от делението му с цяло число.</a:t>
-            </a:r>
-          </a:p>
-          <a:p>
-            <a:pPr>
-              <a:buFont typeface="Wingdings" panose="05000000000000000000" pitchFamily="2" charset="2"/>
-              <a:buChar char="§"/>
-            </a:pPr>
-            <a:r>
               <a:rPr lang="bg-BG" sz="2000" dirty="0" smtClean="0">
                 <a:solidFill>
                   <a:schemeClr val="bg1">
@@ -4732,7 +4849,17 @@
                   </a:schemeClr>
                 </a:solidFill>
               </a:rPr>
-              <a:t>Напишете програма, която приема два стринга като вход. След това проверява дали 2рия стринг се съдържа в 1вия. Покажете резултата от проверката на конзолата.</a:t>
+              <a:t>Напишете </a:t>
+            </a:r>
+            <a:r>
+              <a:rPr lang="bg-BG" sz="2000" dirty="0" smtClean="0">
+                <a:solidFill>
+                  <a:schemeClr val="bg1">
+                    <a:lumMod val="95000"/>
+                  </a:schemeClr>
+                </a:solidFill>
+              </a:rPr>
+              <a:t>програма, която приема два стринга като вход. След това проверява дали 2рия стринг се съдържа в 1вия. Покажете резултата от проверката на конзолата.</a:t>
             </a:r>
             <a:r>
               <a:rPr lang="bg-BG" sz="2000" dirty="0">
@@ -4743,7 +4870,7 @@
               <a:t> </a:t>
             </a:r>
             <a:r>
-              <a:rPr lang="bg-BG" sz="4000" dirty="0" smtClean="0">
+              <a:rPr lang="bg-BG" sz="2400" dirty="0" smtClean="0">
                 <a:solidFill>
                   <a:srgbClr val="FF0000"/>
                 </a:solidFill>
@@ -4794,13 +4921,191 @@
               <a:t>-тия символ от стринга, като резултат. </a:t>
             </a:r>
             <a:r>
-              <a:rPr lang="bg-BG" sz="3600" dirty="0" smtClean="0">
+              <a:rPr lang="bg-BG" sz="2200" dirty="0" smtClean="0">
                 <a:solidFill>
                   <a:srgbClr val="FF0000"/>
                 </a:solidFill>
               </a:rPr>
               <a:t>*</a:t>
             </a:r>
+            <a:endParaRPr lang="en-US" sz="2200" dirty="0" smtClean="0">
+              <a:solidFill>
+                <a:srgbClr val="FF0000"/>
+              </a:solidFill>
+            </a:endParaRPr>
+          </a:p>
+          <a:p>
+            <a:pPr>
+              <a:buFont typeface="Wingdings" panose="05000000000000000000" pitchFamily="2" charset="2"/>
+              <a:buChar char="§"/>
+            </a:pPr>
+            <a:r>
+              <a:rPr lang="ru-RU" sz="2000" dirty="0">
+                <a:solidFill>
+                  <a:schemeClr val="bg1">
+                    <a:lumMod val="95000"/>
+                  </a:schemeClr>
+                </a:solidFill>
+              </a:rPr>
+              <a:t>Напишете булев </a:t>
+            </a:r>
+            <a:r>
+              <a:rPr lang="ru-RU" sz="2000" dirty="0" err="1">
+                <a:solidFill>
+                  <a:schemeClr val="bg1">
+                    <a:lumMod val="95000"/>
+                  </a:schemeClr>
+                </a:solidFill>
+              </a:rPr>
+              <a:t>израз</a:t>
+            </a:r>
+            <a:r>
+              <a:rPr lang="ru-RU" sz="2000" dirty="0">
+                <a:solidFill>
+                  <a:schemeClr val="bg1">
+                    <a:lumMod val="95000"/>
+                  </a:schemeClr>
+                </a:solidFill>
+              </a:rPr>
+              <a:t>, </a:t>
+            </a:r>
+            <a:r>
+              <a:rPr lang="ru-RU" sz="2000" dirty="0" err="1">
+                <a:solidFill>
+                  <a:schemeClr val="bg1">
+                    <a:lumMod val="95000"/>
+                  </a:schemeClr>
+                </a:solidFill>
+              </a:rPr>
+              <a:t>който</a:t>
+            </a:r>
+            <a:r>
+              <a:rPr lang="ru-RU" sz="2000" dirty="0">
+                <a:solidFill>
+                  <a:schemeClr val="bg1">
+                    <a:lumMod val="95000"/>
+                  </a:schemeClr>
+                </a:solidFill>
+              </a:rPr>
+              <a:t> да </a:t>
+            </a:r>
+            <a:r>
+              <a:rPr lang="ru-RU" sz="2000" dirty="0" err="1">
+                <a:solidFill>
+                  <a:schemeClr val="bg1">
+                    <a:lumMod val="95000"/>
+                  </a:schemeClr>
+                </a:solidFill>
+              </a:rPr>
+              <a:t>проверява</a:t>
+            </a:r>
+            <a:r>
+              <a:rPr lang="ru-RU" sz="2000" dirty="0">
+                <a:solidFill>
+                  <a:schemeClr val="bg1">
+                    <a:lumMod val="95000"/>
+                  </a:schemeClr>
+                </a:solidFill>
+              </a:rPr>
+              <a:t> дали даден низ от </a:t>
+            </a:r>
+            <a:r>
+              <a:rPr lang="ru-RU" sz="2000" dirty="0" err="1">
+                <a:solidFill>
+                  <a:schemeClr val="bg1">
+                    <a:lumMod val="95000"/>
+                  </a:schemeClr>
+                </a:solidFill>
+              </a:rPr>
+              <a:t>символи</a:t>
+            </a:r>
+            <a:r>
+              <a:rPr lang="ru-RU" sz="2000" dirty="0">
+                <a:solidFill>
+                  <a:schemeClr val="bg1">
+                    <a:lumMod val="95000"/>
+                  </a:schemeClr>
+                </a:solidFill>
+              </a:rPr>
+              <a:t> (</a:t>
+            </a:r>
+            <a:r>
+              <a:rPr lang="en-US" sz="2000" dirty="0">
+                <a:solidFill>
+                  <a:schemeClr val="bg1">
+                    <a:lumMod val="95000"/>
+                  </a:schemeClr>
+                </a:solidFill>
+              </a:rPr>
+              <a:t>String) </a:t>
+            </a:r>
+            <a:r>
+              <a:rPr lang="bg-BG" sz="2000" dirty="0">
+                <a:solidFill>
+                  <a:schemeClr val="bg1">
+                    <a:lumMod val="95000"/>
+                  </a:schemeClr>
+                </a:solidFill>
+              </a:rPr>
+              <a:t>е равен на „</a:t>
+            </a:r>
+            <a:r>
+              <a:rPr lang="en-US" sz="2000" dirty="0">
+                <a:solidFill>
+                  <a:schemeClr val="bg1">
+                    <a:lumMod val="95000"/>
+                  </a:schemeClr>
+                </a:solidFill>
+              </a:rPr>
+              <a:t>Hello”. </a:t>
+            </a:r>
+            <a:r>
+              <a:rPr lang="bg-BG" sz="2000" dirty="0">
+                <a:solidFill>
+                  <a:schemeClr val="bg1">
+                    <a:lumMod val="95000"/>
+                  </a:schemeClr>
+                </a:solidFill>
+              </a:rPr>
+              <a:t>Отпечатайте в конзолата резултата от проверката</a:t>
+            </a:r>
+            <a:r>
+              <a:rPr lang="bg-BG" sz="2000" dirty="0" smtClean="0">
+                <a:solidFill>
+                  <a:schemeClr val="bg1">
+                    <a:lumMod val="95000"/>
+                  </a:schemeClr>
+                </a:solidFill>
+              </a:rPr>
+              <a:t>.</a:t>
+            </a:r>
+            <a:r>
+              <a:rPr lang="bg-BG" sz="2000" dirty="0">
+                <a:solidFill>
+                  <a:srgbClr val="FF0000"/>
+                </a:solidFill>
+              </a:rPr>
+              <a:t> </a:t>
+            </a:r>
+            <a:r>
+              <a:rPr lang="bg-BG" sz="2200" dirty="0" smtClean="0">
+                <a:solidFill>
+                  <a:srgbClr val="FF0000"/>
+                </a:solidFill>
+              </a:rPr>
+              <a:t>*</a:t>
+            </a:r>
+            <a:endParaRPr lang="bg-BG" sz="2200" dirty="0">
+              <a:solidFill>
+                <a:srgbClr val="FF0000"/>
+              </a:solidFill>
+            </a:endParaRPr>
+          </a:p>
+          <a:p>
+            <a:pPr>
+              <a:buFont typeface="Wingdings" panose="05000000000000000000" pitchFamily="2" charset="2"/>
+              <a:buChar char="§"/>
+            </a:pPr>
             <a:endParaRPr lang="ru-RU" sz="2000" dirty="0">
               <a:solidFill>
                 <a:srgbClr val="FF0000"/>
@@ -6473,17 +6778,7 @@
                   </a:schemeClr>
                 </a:solidFill>
               </a:rPr>
-              <a:t> </a:t>
-            </a:r>
-            <a:r>
-              <a:rPr lang="bg-BG" dirty="0" smtClean="0">
-                <a:solidFill>
-                  <a:schemeClr val="bg1">
-                    <a:lumMod val="95000"/>
-                  </a:schemeClr>
-                </a:solidFill>
-              </a:rPr>
-              <a:t> и </a:t>
+              <a:t>  и </a:t>
             </a:r>
             <a:r>
               <a:rPr lang="en-US" b="1" dirty="0" smtClean="0">
@@ -6495,13 +6790,6 @@
               </a:rPr>
               <a:t>double</a:t>
             </a:r>
-            <a:endParaRPr lang="en-US" b="1" dirty="0" smtClean="0">
-              <a:solidFill>
-                <a:schemeClr val="bg1">
-                  <a:lumMod val="95000"/>
-                </a:schemeClr>
-              </a:solidFill>
-            </a:endParaRPr>
           </a:p>
           <a:p>
             <a:pPr>

</xml_diff>